<commit_message>
qa fix to capstatements, update hrex to ver 0.2.0
</commit_message>
<xml_diff>
--- a/input/images/source/Message_Graphs.pptx
+++ b/input/images/source/Message_Graphs.pptx
@@ -248,6 +248,11 @@
       </a:defRPr>
     </a:lvl9pPr>
   </p:defaultTextStyle>
+  <p:extLst>
+    <p:ext uri="{EFAFB233-063F-42B5-8137-9DF3F51BA10A}">
+      <p15:sldGuideLst xmlns:p15="http://schemas.microsoft.com/office/powerpoint/2012/main"/>
+    </p:ext>
+  </p:extLst>
 </p:presentation>
 </file>
 
@@ -18244,7 +18249,7 @@
               <a:buNone/>
             </a:pPr>
             <a:r>
-              <a:rPr lang="en-US" sz="1800">
+              <a:rPr lang="en-US" sz="1800" dirty="0">
                 <a:solidFill>
                   <a:schemeClr val="lt1"/>
                 </a:solidFill>
@@ -18253,9 +18258,9 @@
                 <a:cs typeface="Calibri"/>
                 <a:sym typeface="Calibri"/>
               </a:rPr>
-              <a:t>Da Vinci HRex Coverage</a:t>
+              <a:t>Da Vinci Coverage</a:t>
             </a:r>
-            <a:endParaRPr/>
+            <a:endParaRPr dirty="0"/>
           </a:p>
         </p:txBody>
       </p:sp>
@@ -19959,7 +19964,7 @@
               <a:buNone/>
             </a:pPr>
             <a:r>
-              <a:rPr lang="en-US" sz="1800">
+              <a:rPr lang="en-US" sz="1800" dirty="0">
                 <a:solidFill>
                   <a:schemeClr val="lt1"/>
                 </a:solidFill>
@@ -19968,9 +19973,9 @@
                 <a:cs typeface="Calibri"/>
                 <a:sym typeface="Calibri"/>
               </a:rPr>
-              <a:t>Da Vinci HRex Coverage</a:t>
+              <a:t>Da Vinci Coverage</a:t>
             </a:r>
-            <a:endParaRPr/>
+            <a:endParaRPr dirty="0"/>
           </a:p>
         </p:txBody>
       </p:sp>
@@ -23328,7 +23333,7 @@
               <a:buNone/>
             </a:pPr>
             <a:r>
-              <a:rPr lang="en-US">
+              <a:rPr lang="en-US" dirty="0">
                 <a:solidFill>
                   <a:schemeClr val="dk1"/>
                 </a:solidFill>
@@ -23339,7 +23344,7 @@
               </a:rPr>
               <a:t>US Core Practitioner</a:t>
             </a:r>
-            <a:endParaRPr>
+            <a:endParaRPr dirty="0">
               <a:solidFill>
                 <a:schemeClr val="dk1"/>
               </a:solidFill>
@@ -23535,15 +23540,15 @@
               <a:buNone/>
             </a:pPr>
             <a:r>
-              <a:rPr lang="en-US">
+              <a:rPr lang="en-US" dirty="0">
                 <a:latin typeface="Calibri"/>
                 <a:ea typeface="Calibri"/>
                 <a:cs typeface="Calibri"/>
                 <a:sym typeface="Calibri"/>
               </a:rPr>
-              <a:t>Da Vinci HRex Coverage</a:t>
+              <a:t>Da Vinci Coverage</a:t>
             </a:r>
-            <a:endParaRPr>
+            <a:endParaRPr dirty="0">
               <a:latin typeface="Calibri"/>
               <a:ea typeface="Calibri"/>
               <a:cs typeface="Calibri"/>
@@ -24891,7 +24896,7 @@
         <p:spPr>
           <a:xfrm>
             <a:off x="6570588" y="4840655"/>
-            <a:ext cx="395100" cy="0"/>
+            <a:ext cx="395000" cy="0"/>
           </a:xfrm>
           <a:prstGeom prst="straightConnector1">
             <a:avLst/>

</xml_diff>